<commit_message>
Minor corrections and edits in codefights and slides.
</commit_message>
<xml_diff>
--- a/Termin_1/folien/UebungModellierung#1.pptx
+++ b/Termin_1/folien/UebungModellierung#1.pptx
@@ -401,7 +401,7 @@
     </p:spTree>
     <p:extLst>
       <p:ext uri="{BB962C8B-B14F-4D97-AF65-F5344CB8AC3E}">
-        <p14:creationId xmlns="" xmlns:p14="http://schemas.microsoft.com/office/powerpoint/2010/main" val="1882660213"/>
+        <p14:creationId xmlns:p14="http://schemas.microsoft.com/office/powerpoint/2010/main" xmlns="" val="1882660213"/>
       </p:ext>
     </p:extLst>
   </p:cSld>
@@ -740,7 +740,7 @@
     </p:spTree>
     <p:extLst>
       <p:ext uri="{BB962C8B-B14F-4D97-AF65-F5344CB8AC3E}">
-        <p14:creationId xmlns="" xmlns:p14="http://schemas.microsoft.com/office/powerpoint/2010/main" val="2781074432"/>
+        <p14:creationId xmlns:p14="http://schemas.microsoft.com/office/powerpoint/2010/main" xmlns="" val="2781074432"/>
       </p:ext>
     </p:extLst>
   </p:cSld>
@@ -4327,37 +4327,7 @@
                 <a:latin typeface="Calibri" pitchFamily="34" charset="0"/>
                 <a:cs typeface="+mn-cs"/>
               </a:rPr>
-              <a:t>Seminar „Einführung </a:t>
-            </a:r>
-            <a:r>
-              <a:rPr lang="de-DE" noProof="0" dirty="0" smtClean="0">
-                <a:solidFill>
-                  <a:schemeClr val="bg1"/>
-                </a:solidFill>
-                <a:latin typeface="Calibri" pitchFamily="34" charset="0"/>
-                <a:cs typeface="+mn-cs"/>
-              </a:rPr>
-              <a:t>in die </a:t>
-            </a:r>
-            <a:r>
-              <a:rPr lang="de-DE" noProof="0" dirty="0" smtClean="0">
-                <a:solidFill>
-                  <a:schemeClr val="bg1"/>
-                </a:solidFill>
-                <a:latin typeface="Calibri" pitchFamily="34" charset="0"/>
-                <a:cs typeface="+mn-cs"/>
-              </a:rPr>
-              <a:t>Modellierung“, </a:t>
-            </a:r>
-            <a:r>
-              <a:rPr lang="de-DE" noProof="0" dirty="0" smtClean="0">
-                <a:solidFill>
-                  <a:schemeClr val="bg1"/>
-                </a:solidFill>
-                <a:latin typeface="Calibri" pitchFamily="34" charset="0"/>
-                <a:cs typeface="+mn-cs"/>
-              </a:rPr>
-              <a:t>Wintersemester 2016/17                 #</a:t>
+              <a:t>Seminar „Einführung in die Modellierung“, Wintersemester 2016/17                 #</a:t>
             </a:r>
             <a:fld id="{19621714-58BB-457A-826B-841F6E217726}" type="slidenum">
               <a:rPr lang="de-DE" noProof="0" smtClean="0">
@@ -5157,23 +5127,8 @@
                 <a:rPr lang="de-DE" sz="2000" i="1" dirty="0" smtClean="0">
                   <a:latin typeface="Calibri" pitchFamily="34" charset="0"/>
                 </a:rPr>
-                <a:t>Versuchsplanung </a:t>
+                <a:t>Versuchsplanung und Geoökologische Modellierung</a:t>
               </a:r>
-              <a:r>
-                <a:rPr lang="de-DE" sz="2000" i="1" dirty="0" smtClean="0">
-                  <a:latin typeface="Calibri" pitchFamily="34" charset="0"/>
-                </a:rPr>
-                <a:t>und Geoökologische </a:t>
-              </a:r>
-              <a:r>
-                <a:rPr lang="de-DE" sz="2000" i="1" dirty="0" smtClean="0">
-                  <a:latin typeface="Calibri" pitchFamily="34" charset="0"/>
-                </a:rPr>
-                <a:t>Modellierung</a:t>
-              </a:r>
-              <a:endParaRPr lang="de-DE" sz="2000" i="1" dirty="0" smtClean="0">
-                <a:latin typeface="Calibri" pitchFamily="34" charset="0"/>
-              </a:endParaRPr>
             </a:p>
           </p:txBody>
         </p:sp>
@@ -6239,14 +6194,6 @@
               </a:rPr>
               <a:t> Fight </a:t>
             </a:r>
-            <a:endParaRPr lang="en-US" sz="2800" dirty="0" smtClean="0">
-              <a:solidFill>
-                <a:schemeClr val="bg1">
-                  <a:lumMod val="85000"/>
-                </a:schemeClr>
-              </a:solidFill>
-              <a:latin typeface="Calibri" pitchFamily="34" charset="0"/>
-            </a:endParaRPr>
           </a:p>
         </p:txBody>
       </p:sp>
@@ -7105,7 +7052,7 @@
               <a:rPr lang="de-DE" sz="2400" dirty="0" smtClean="0">
                 <a:latin typeface="Calibri" pitchFamily="34" charset="0"/>
               </a:rPr>
-              <a:t>Hydrologische Modelle </a:t>
+              <a:t>Ökologische Modelle</a:t>
             </a:r>
           </a:p>
           <a:p>
@@ -7115,11 +7062,20 @@
               </a:spcAft>
             </a:pPr>
             <a:r>
-              <a:rPr lang="de-DE" sz="2400" dirty="0" smtClean="0">
+              <a:rPr lang="de-DE" sz="2400" smtClean="0">
                 <a:latin typeface="Calibri" pitchFamily="34" charset="0"/>
               </a:rPr>
-              <a:t>Ökologische Modelle</a:t>
-            </a:r>
+              <a:t>Hydrologische </a:t>
+            </a:r>
+            <a:r>
+              <a:rPr lang="de-DE" sz="2400" smtClean="0">
+                <a:latin typeface="Calibri" pitchFamily="34" charset="0"/>
+              </a:rPr>
+              <a:t>Modelle </a:t>
+            </a:r>
+            <a:endParaRPr lang="de-DE" sz="2400" dirty="0" smtClean="0">
+              <a:latin typeface="Calibri" pitchFamily="34" charset="0"/>
+            </a:endParaRPr>
           </a:p>
           <a:p>
             <a:pPr marL="269875" indent="-269875" algn="ctr">

</xml_diff>